<commit_message>
modified:   preproposalPresentation.pdf 	modified:   preproposalPresentation.pptx
</commit_message>
<xml_diff>
--- a/preproposalPresentation.pptx
+++ b/preproposalPresentation.pptx
@@ -181,7 +181,7 @@
           <a:noFill/>
           <a:extLst>
             <a:ext uri="{909E8E84-426E-40dd-AFC4-6F175D3DCCD1}">
-              <a14:hiddenFill xmlns:a14="http://schemas.microsoft.com/office/drawing/2010/main" xmlns="">
+              <a14:hiddenFill xmlns="" xmlns:a14="http://schemas.microsoft.com/office/drawing/2010/main">
                 <a:solidFill>
                   <a:srgbClr val="FFFFFF"/>
                 </a:solidFill>
@@ -241,7 +241,7 @@
             </a:ln>
             <a:extLst>
               <a:ext uri="{91240B29-F687-4f45-9708-019B960494DF}">
-                <a14:hiddenLine xmlns:a14="http://schemas.microsoft.com/office/drawing/2010/main" xmlns="" w="9525">
+                <a14:hiddenLine xmlns="" xmlns:a14="http://schemas.microsoft.com/office/drawing/2010/main" w="9525">
                   <a:solidFill>
                     <a:srgbClr val="000000"/>
                   </a:solidFill>
@@ -331,7 +331,7 @@
             </a:ln>
             <a:extLst>
               <a:ext uri="{91240B29-F687-4f45-9708-019B960494DF}">
-                <a14:hiddenLine xmlns:a14="http://schemas.microsoft.com/office/drawing/2010/main" xmlns="" w="9525">
+                <a14:hiddenLine xmlns="" xmlns:a14="http://schemas.microsoft.com/office/drawing/2010/main" w="9525">
                   <a:solidFill>
                     <a:srgbClr val="000000"/>
                   </a:solidFill>
@@ -421,7 +421,7 @@
             </a:ln>
             <a:extLst>
               <a:ext uri="{91240B29-F687-4f45-9708-019B960494DF}">
-                <a14:hiddenLine xmlns:a14="http://schemas.microsoft.com/office/drawing/2010/main" xmlns="" w="9525">
+                <a14:hiddenLine xmlns="" xmlns:a14="http://schemas.microsoft.com/office/drawing/2010/main" w="9525">
                   <a:solidFill>
                     <a:srgbClr val="000000"/>
                   </a:solidFill>
@@ -455,7 +455,7 @@
             </a:ln>
             <a:extLst>
               <a:ext uri="{91240B29-F687-4f45-9708-019B960494DF}">
-                <a14:hiddenLine xmlns:a14="http://schemas.microsoft.com/office/drawing/2010/main" xmlns="" w="9525">
+                <a14:hiddenLine xmlns="" xmlns:a14="http://schemas.microsoft.com/office/drawing/2010/main" w="9525">
                   <a:solidFill>
                     <a:srgbClr val="000000"/>
                   </a:solidFill>
@@ -545,7 +545,7 @@
             </a:ln>
             <a:extLst>
               <a:ext uri="{91240B29-F687-4f45-9708-019B960494DF}">
-                <a14:hiddenLine xmlns:a14="http://schemas.microsoft.com/office/drawing/2010/main" xmlns="" w="9525">
+                <a14:hiddenLine xmlns="" xmlns:a14="http://schemas.microsoft.com/office/drawing/2010/main" w="9525">
                   <a:solidFill>
                     <a:srgbClr val="000000"/>
                   </a:solidFill>
@@ -607,7 +607,7 @@
             </a:ln>
             <a:extLst>
               <a:ext uri="{91240B29-F687-4f45-9708-019B960494DF}">
-                <a14:hiddenLine xmlns:a14="http://schemas.microsoft.com/office/drawing/2010/main" xmlns="" w="9525">
+                <a14:hiddenLine xmlns="" xmlns:a14="http://schemas.microsoft.com/office/drawing/2010/main" w="9525">
                   <a:solidFill>
                     <a:srgbClr val="000000"/>
                   </a:solidFill>
@@ -669,7 +669,7 @@
             </a:ln>
             <a:extLst>
               <a:ext uri="{91240B29-F687-4f45-9708-019B960494DF}">
-                <a14:hiddenLine xmlns:a14="http://schemas.microsoft.com/office/drawing/2010/main" xmlns="" w="9525">
+                <a14:hiddenLine xmlns="" xmlns:a14="http://schemas.microsoft.com/office/drawing/2010/main" w="9525">
                   <a:solidFill>
                     <a:srgbClr val="000000"/>
                   </a:solidFill>
@@ -759,7 +759,7 @@
             </a:ln>
             <a:extLst>
               <a:ext uri="{91240B29-F687-4f45-9708-019B960494DF}">
-                <a14:hiddenLine xmlns:a14="http://schemas.microsoft.com/office/drawing/2010/main" xmlns="" w="9525">
+                <a14:hiddenLine xmlns="" xmlns:a14="http://schemas.microsoft.com/office/drawing/2010/main" w="9525">
                   <a:solidFill>
                     <a:srgbClr val="000000"/>
                   </a:solidFill>
@@ -821,7 +821,7 @@
             </a:ln>
             <a:extLst>
               <a:ext uri="{91240B29-F687-4f45-9708-019B960494DF}">
-                <a14:hiddenLine xmlns:a14="http://schemas.microsoft.com/office/drawing/2010/main" xmlns="" w="9525">
+                <a14:hiddenLine xmlns="" xmlns:a14="http://schemas.microsoft.com/office/drawing/2010/main" w="9525">
                   <a:solidFill>
                     <a:srgbClr val="000000"/>
                   </a:solidFill>
@@ -883,7 +883,7 @@
             </a:ln>
             <a:extLst>
               <a:ext uri="{91240B29-F687-4f45-9708-019B960494DF}">
-                <a14:hiddenLine xmlns:a14="http://schemas.microsoft.com/office/drawing/2010/main" xmlns="" w="9525">
+                <a14:hiddenLine xmlns="" xmlns:a14="http://schemas.microsoft.com/office/drawing/2010/main" w="9525">
                   <a:solidFill>
                     <a:srgbClr val="000000"/>
                   </a:solidFill>
@@ -973,7 +973,7 @@
             </a:ln>
             <a:extLst>
               <a:ext uri="{91240B29-F687-4f45-9708-019B960494DF}">
-                <a14:hiddenLine xmlns:a14="http://schemas.microsoft.com/office/drawing/2010/main" xmlns="" w="9525">
+                <a14:hiddenLine xmlns="" xmlns:a14="http://schemas.microsoft.com/office/drawing/2010/main" w="9525">
                   <a:solidFill>
                     <a:srgbClr val="000000"/>
                   </a:solidFill>
@@ -1063,7 +1063,7 @@
             </a:ln>
             <a:extLst>
               <a:ext uri="{91240B29-F687-4f45-9708-019B960494DF}">
-                <a14:hiddenLine xmlns:a14="http://schemas.microsoft.com/office/drawing/2010/main" xmlns="" w="9525">
+                <a14:hiddenLine xmlns="" xmlns:a14="http://schemas.microsoft.com/office/drawing/2010/main" w="9525">
                   <a:solidFill>
                     <a:srgbClr val="000000"/>
                   </a:solidFill>
@@ -1125,7 +1125,7 @@
             </a:ln>
             <a:extLst>
               <a:ext uri="{91240B29-F687-4f45-9708-019B960494DF}">
-                <a14:hiddenLine xmlns:a14="http://schemas.microsoft.com/office/drawing/2010/main" xmlns="" w="9525">
+                <a14:hiddenLine xmlns="" xmlns:a14="http://schemas.microsoft.com/office/drawing/2010/main" w="9525">
                   <a:solidFill>
                     <a:srgbClr val="000000"/>
                   </a:solidFill>
@@ -1235,7 +1235,7 @@
             </a:ln>
             <a:extLst>
               <a:ext uri="{91240B29-F687-4f45-9708-019B960494DF}">
-                <a14:hiddenLine xmlns:a14="http://schemas.microsoft.com/office/drawing/2010/main" xmlns="" w="9525">
+                <a14:hiddenLine xmlns="" xmlns:a14="http://schemas.microsoft.com/office/drawing/2010/main" w="9525">
                   <a:solidFill>
                     <a:srgbClr val="000000"/>
                   </a:solidFill>
@@ -1297,7 +1297,7 @@
             </a:ln>
             <a:extLst>
               <a:ext uri="{91240B29-F687-4f45-9708-019B960494DF}">
-                <a14:hiddenLine xmlns:a14="http://schemas.microsoft.com/office/drawing/2010/main" xmlns="" w="9525">
+                <a14:hiddenLine xmlns="" xmlns:a14="http://schemas.microsoft.com/office/drawing/2010/main" w="9525">
                   <a:solidFill>
                     <a:srgbClr val="000000"/>
                   </a:solidFill>
@@ -1387,7 +1387,7 @@
             </a:ln>
             <a:extLst>
               <a:ext uri="{91240B29-F687-4f45-9708-019B960494DF}">
-                <a14:hiddenLine xmlns:a14="http://schemas.microsoft.com/office/drawing/2010/main" xmlns="" w="9525">
+                <a14:hiddenLine xmlns="" xmlns:a14="http://schemas.microsoft.com/office/drawing/2010/main" w="9525">
                   <a:solidFill>
                     <a:srgbClr val="000000"/>
                   </a:solidFill>
@@ -1477,7 +1477,7 @@
             </a:ln>
             <a:extLst>
               <a:ext uri="{91240B29-F687-4f45-9708-019B960494DF}">
-                <a14:hiddenLine xmlns:a14="http://schemas.microsoft.com/office/drawing/2010/main" xmlns="" w="9525">
+                <a14:hiddenLine xmlns="" xmlns:a14="http://schemas.microsoft.com/office/drawing/2010/main" w="9525">
                   <a:solidFill>
                     <a:srgbClr val="000000"/>
                   </a:solidFill>
@@ -1539,7 +1539,7 @@
             </a:ln>
             <a:extLst>
               <a:ext uri="{91240B29-F687-4f45-9708-019B960494DF}">
-                <a14:hiddenLine xmlns:a14="http://schemas.microsoft.com/office/drawing/2010/main" xmlns="" w="9525">
+                <a14:hiddenLine xmlns="" xmlns:a14="http://schemas.microsoft.com/office/drawing/2010/main" w="9525">
                   <a:solidFill>
                     <a:srgbClr val="000000"/>
                   </a:solidFill>
@@ -1629,7 +1629,7 @@
             </a:ln>
             <a:extLst>
               <a:ext uri="{91240B29-F687-4f45-9708-019B960494DF}">
-                <a14:hiddenLine xmlns:a14="http://schemas.microsoft.com/office/drawing/2010/main" xmlns="" w="9525">
+                <a14:hiddenLine xmlns="" xmlns:a14="http://schemas.microsoft.com/office/drawing/2010/main" w="9525">
                   <a:solidFill>
                     <a:srgbClr val="000000"/>
                   </a:solidFill>
@@ -1719,7 +1719,7 @@
             </a:ln>
             <a:extLst>
               <a:ext uri="{91240B29-F687-4f45-9708-019B960494DF}">
-                <a14:hiddenLine xmlns:a14="http://schemas.microsoft.com/office/drawing/2010/main" xmlns="" w="9525">
+                <a14:hiddenLine xmlns="" xmlns:a14="http://schemas.microsoft.com/office/drawing/2010/main" w="9525">
                   <a:solidFill>
                     <a:srgbClr val="000000"/>
                   </a:solidFill>
@@ -1775,7 +1775,7 @@
             </a:ln>
             <a:extLst>
               <a:ext uri="{91240B29-F687-4f45-9708-019B960494DF}">
-                <a14:hiddenLine xmlns:a14="http://schemas.microsoft.com/office/drawing/2010/main" xmlns="" w="9525">
+                <a14:hiddenLine xmlns="" xmlns:a14="http://schemas.microsoft.com/office/drawing/2010/main" w="9525">
                   <a:solidFill>
                     <a:srgbClr val="000000"/>
                   </a:solidFill>
@@ -1865,7 +1865,7 @@
             </a:ln>
             <a:extLst>
               <a:ext uri="{91240B29-F687-4f45-9708-019B960494DF}">
-                <a14:hiddenLine xmlns:a14="http://schemas.microsoft.com/office/drawing/2010/main" xmlns="" w="9525">
+                <a14:hiddenLine xmlns="" xmlns:a14="http://schemas.microsoft.com/office/drawing/2010/main" w="9525">
                   <a:solidFill>
                     <a:srgbClr val="000000"/>
                   </a:solidFill>
@@ -1921,7 +1921,7 @@
             </a:ln>
             <a:extLst>
               <a:ext uri="{91240B29-F687-4f45-9708-019B960494DF}">
-                <a14:hiddenLine xmlns:a14="http://schemas.microsoft.com/office/drawing/2010/main" xmlns="" w="9525">
+                <a14:hiddenLine xmlns="" xmlns:a14="http://schemas.microsoft.com/office/drawing/2010/main" w="9525">
                   <a:solidFill>
                     <a:srgbClr val="000000"/>
                   </a:solidFill>
@@ -2011,7 +2011,7 @@
             </a:ln>
             <a:extLst>
               <a:ext uri="{91240B29-F687-4f45-9708-019B960494DF}">
-                <a14:hiddenLine xmlns:a14="http://schemas.microsoft.com/office/drawing/2010/main" xmlns="" w="9525">
+                <a14:hiddenLine xmlns="" xmlns:a14="http://schemas.microsoft.com/office/drawing/2010/main" w="9525">
                   <a:solidFill>
                     <a:srgbClr val="000000"/>
                   </a:solidFill>
@@ -2079,7 +2079,7 @@
             </a:ln>
             <a:extLst>
               <a:ext uri="{91240B29-F687-4f45-9708-019B960494DF}">
-                <a14:hiddenLine xmlns:a14="http://schemas.microsoft.com/office/drawing/2010/main" xmlns="" w="9525">
+                <a14:hiddenLine xmlns="" xmlns:a14="http://schemas.microsoft.com/office/drawing/2010/main" w="9525">
                   <a:solidFill>
                     <a:srgbClr val="000000"/>
                   </a:solidFill>
@@ -2169,7 +2169,7 @@
             </a:ln>
             <a:extLst>
               <a:ext uri="{91240B29-F687-4f45-9708-019B960494DF}">
-                <a14:hiddenLine xmlns:a14="http://schemas.microsoft.com/office/drawing/2010/main" xmlns="" w="9525">
+                <a14:hiddenLine xmlns="" xmlns:a14="http://schemas.microsoft.com/office/drawing/2010/main" w="9525">
                   <a:solidFill>
                     <a:srgbClr val="000000"/>
                   </a:solidFill>
@@ -2237,7 +2237,7 @@
             </a:ln>
             <a:extLst>
               <a:ext uri="{91240B29-F687-4f45-9708-019B960494DF}">
-                <a14:hiddenLine xmlns:a14="http://schemas.microsoft.com/office/drawing/2010/main" xmlns="" w="9525">
+                <a14:hiddenLine xmlns="" xmlns:a14="http://schemas.microsoft.com/office/drawing/2010/main" w="9525">
                   <a:solidFill>
                     <a:srgbClr val="000000"/>
                   </a:solidFill>
@@ -2327,7 +2327,7 @@
             </a:ln>
             <a:extLst>
               <a:ext uri="{91240B29-F687-4f45-9708-019B960494DF}">
-                <a14:hiddenLine xmlns:a14="http://schemas.microsoft.com/office/drawing/2010/main" xmlns="" w="9525">
+                <a14:hiddenLine xmlns="" xmlns:a14="http://schemas.microsoft.com/office/drawing/2010/main" w="9525">
                   <a:solidFill>
                     <a:srgbClr val="000000"/>
                   </a:solidFill>
@@ -2361,7 +2361,7 @@
             </a:ln>
             <a:extLst>
               <a:ext uri="{91240B29-F687-4f45-9708-019B960494DF}">
-                <a14:hiddenLine xmlns:a14="http://schemas.microsoft.com/office/drawing/2010/main" xmlns="" w="9525">
+                <a14:hiddenLine xmlns="" xmlns:a14="http://schemas.microsoft.com/office/drawing/2010/main" w="9525">
                   <a:solidFill>
                     <a:srgbClr val="000000"/>
                   </a:solidFill>
@@ -2451,7 +2451,7 @@
             </a:ln>
             <a:extLst>
               <a:ext uri="{91240B29-F687-4f45-9708-019B960494DF}">
-                <a14:hiddenLine xmlns:a14="http://schemas.microsoft.com/office/drawing/2010/main" xmlns="" w="9525">
+                <a14:hiddenLine xmlns="" xmlns:a14="http://schemas.microsoft.com/office/drawing/2010/main" w="9525">
                   <a:solidFill>
                     <a:srgbClr val="000000"/>
                   </a:solidFill>
@@ -2513,7 +2513,7 @@
             </a:ln>
             <a:extLst>
               <a:ext uri="{91240B29-F687-4f45-9708-019B960494DF}">
-                <a14:hiddenLine xmlns:a14="http://schemas.microsoft.com/office/drawing/2010/main" xmlns="" w="9525">
+                <a14:hiddenLine xmlns="" xmlns:a14="http://schemas.microsoft.com/office/drawing/2010/main" w="9525">
                   <a:solidFill>
                     <a:srgbClr val="000000"/>
                   </a:solidFill>
@@ -2575,7 +2575,7 @@
             </a:ln>
             <a:extLst>
               <a:ext uri="{91240B29-F687-4f45-9708-019B960494DF}">
-                <a14:hiddenLine xmlns:a14="http://schemas.microsoft.com/office/drawing/2010/main" xmlns="" w="9525">
+                <a14:hiddenLine xmlns="" xmlns:a14="http://schemas.microsoft.com/office/drawing/2010/main" w="9525">
                   <a:solidFill>
                     <a:srgbClr val="000000"/>
                   </a:solidFill>
@@ -2665,7 +2665,7 @@
             </a:ln>
             <a:extLst>
               <a:ext uri="{91240B29-F687-4f45-9708-019B960494DF}">
-                <a14:hiddenLine xmlns:a14="http://schemas.microsoft.com/office/drawing/2010/main" xmlns="" w="9525">
+                <a14:hiddenLine xmlns="" xmlns:a14="http://schemas.microsoft.com/office/drawing/2010/main" w="9525">
                   <a:solidFill>
                     <a:srgbClr val="000000"/>
                   </a:solidFill>
@@ -2733,7 +2733,7 @@
             </a:ln>
             <a:extLst>
               <a:ext uri="{91240B29-F687-4f45-9708-019B960494DF}">
-                <a14:hiddenLine xmlns:a14="http://schemas.microsoft.com/office/drawing/2010/main" xmlns="" w="9525">
+                <a14:hiddenLine xmlns="" xmlns:a14="http://schemas.microsoft.com/office/drawing/2010/main" w="9525">
                   <a:solidFill>
                     <a:srgbClr val="000000"/>
                   </a:solidFill>
@@ -2795,7 +2795,7 @@
             </a:ln>
             <a:extLst>
               <a:ext uri="{91240B29-F687-4f45-9708-019B960494DF}">
-                <a14:hiddenLine xmlns:a14="http://schemas.microsoft.com/office/drawing/2010/main" xmlns="" w="9525">
+                <a14:hiddenLine xmlns="" xmlns:a14="http://schemas.microsoft.com/office/drawing/2010/main" w="9525">
                   <a:solidFill>
                     <a:srgbClr val="000000"/>
                   </a:solidFill>
@@ -2885,7 +2885,7 @@
             </a:ln>
             <a:extLst>
               <a:ext uri="{91240B29-F687-4f45-9708-019B960494DF}">
-                <a14:hiddenLine xmlns:a14="http://schemas.microsoft.com/office/drawing/2010/main" xmlns="" w="9525">
+                <a14:hiddenLine xmlns="" xmlns:a14="http://schemas.microsoft.com/office/drawing/2010/main" w="9525">
                   <a:solidFill>
                     <a:srgbClr val="000000"/>
                   </a:solidFill>
@@ -2947,7 +2947,7 @@
             </a:ln>
             <a:extLst>
               <a:ext uri="{91240B29-F687-4f45-9708-019B960494DF}">
-                <a14:hiddenLine xmlns:a14="http://schemas.microsoft.com/office/drawing/2010/main" xmlns="" w="9525">
+                <a14:hiddenLine xmlns="" xmlns:a14="http://schemas.microsoft.com/office/drawing/2010/main" w="9525">
                   <a:solidFill>
                     <a:srgbClr val="000000"/>
                   </a:solidFill>
@@ -3037,7 +3037,7 @@
             </a:ln>
             <a:extLst>
               <a:ext uri="{91240B29-F687-4f45-9708-019B960494DF}">
-                <a14:hiddenLine xmlns:a14="http://schemas.microsoft.com/office/drawing/2010/main" xmlns="" w="9525">
+                <a14:hiddenLine xmlns="" xmlns:a14="http://schemas.microsoft.com/office/drawing/2010/main" w="9525">
                   <a:solidFill>
                     <a:srgbClr val="000000"/>
                   </a:solidFill>
@@ -3099,7 +3099,7 @@
             </a:ln>
             <a:extLst>
               <a:ext uri="{91240B29-F687-4f45-9708-019B960494DF}">
-                <a14:hiddenLine xmlns:a14="http://schemas.microsoft.com/office/drawing/2010/main" xmlns="" w="9525">
+                <a14:hiddenLine xmlns="" xmlns:a14="http://schemas.microsoft.com/office/drawing/2010/main" w="9525">
                   <a:solidFill>
                     <a:srgbClr val="000000"/>
                   </a:solidFill>
@@ -3189,7 +3189,7 @@
             </a:ln>
             <a:extLst>
               <a:ext uri="{91240B29-F687-4f45-9708-019B960494DF}">
-                <a14:hiddenLine xmlns:a14="http://schemas.microsoft.com/office/drawing/2010/main" xmlns="" w="9525">
+                <a14:hiddenLine xmlns="" xmlns:a14="http://schemas.microsoft.com/office/drawing/2010/main" w="9525">
                   <a:solidFill>
                     <a:srgbClr val="000000"/>
                   </a:solidFill>
@@ -3223,7 +3223,7 @@
             </a:ln>
             <a:extLst>
               <a:ext uri="{91240B29-F687-4f45-9708-019B960494DF}">
-                <a14:hiddenLine xmlns:a14="http://schemas.microsoft.com/office/drawing/2010/main" xmlns="" w="9525">
+                <a14:hiddenLine xmlns="" xmlns:a14="http://schemas.microsoft.com/office/drawing/2010/main" w="9525">
                   <a:solidFill>
                     <a:srgbClr val="000000"/>
                   </a:solidFill>
@@ -3288,7 +3288,7 @@
             </a:ln>
             <a:extLst>
               <a:ext uri="{91240B29-F687-4f45-9708-019B960494DF}">
-                <a14:hiddenLine xmlns:a14="http://schemas.microsoft.com/office/drawing/2010/main" xmlns="" w="9525">
+                <a14:hiddenLine xmlns="" xmlns:a14="http://schemas.microsoft.com/office/drawing/2010/main" w="9525">
                   <a:solidFill>
                     <a:srgbClr val="000000"/>
                   </a:solidFill>
@@ -3378,7 +3378,7 @@
             </a:ln>
             <a:extLst>
               <a:ext uri="{91240B29-F687-4f45-9708-019B960494DF}">
-                <a14:hiddenLine xmlns:a14="http://schemas.microsoft.com/office/drawing/2010/main" xmlns="" w="9525">
+                <a14:hiddenLine xmlns="" xmlns:a14="http://schemas.microsoft.com/office/drawing/2010/main" w="9525">
                   <a:solidFill>
                     <a:srgbClr val="000000"/>
                   </a:solidFill>
@@ -3440,7 +3440,7 @@
             </a:ln>
             <a:extLst>
               <a:ext uri="{91240B29-F687-4f45-9708-019B960494DF}">
-                <a14:hiddenLine xmlns:a14="http://schemas.microsoft.com/office/drawing/2010/main" xmlns="" w="9525">
+                <a14:hiddenLine xmlns="" xmlns:a14="http://schemas.microsoft.com/office/drawing/2010/main" w="9525">
                   <a:solidFill>
                     <a:srgbClr val="000000"/>
                   </a:solidFill>
@@ -3530,7 +3530,7 @@
             </a:ln>
             <a:extLst>
               <a:ext uri="{91240B29-F687-4f45-9708-019B960494DF}">
-                <a14:hiddenLine xmlns:a14="http://schemas.microsoft.com/office/drawing/2010/main" xmlns="" w="9525">
+                <a14:hiddenLine xmlns="" xmlns:a14="http://schemas.microsoft.com/office/drawing/2010/main" w="9525">
                   <a:solidFill>
                     <a:srgbClr val="000000"/>
                   </a:solidFill>
@@ -3620,7 +3620,7 @@
             </a:ln>
             <a:extLst>
               <a:ext uri="{91240B29-F687-4f45-9708-019B960494DF}">
-                <a14:hiddenLine xmlns:a14="http://schemas.microsoft.com/office/drawing/2010/main" xmlns="" w="9525">
+                <a14:hiddenLine xmlns="" xmlns:a14="http://schemas.microsoft.com/office/drawing/2010/main" w="9525">
                   <a:solidFill>
                     <a:srgbClr val="000000"/>
                   </a:solidFill>
@@ -3685,7 +3685,7 @@
             </a:ln>
             <a:extLst>
               <a:ext uri="{91240B29-F687-4f45-9708-019B960494DF}">
-                <a14:hiddenLine xmlns:a14="http://schemas.microsoft.com/office/drawing/2010/main" xmlns="" w="9525">
+                <a14:hiddenLine xmlns="" xmlns:a14="http://schemas.microsoft.com/office/drawing/2010/main" w="9525">
                   <a:solidFill>
                     <a:srgbClr val="000000"/>
                   </a:solidFill>
@@ -3747,7 +3747,7 @@
             </a:ln>
             <a:extLst>
               <a:ext uri="{91240B29-F687-4f45-9708-019B960494DF}">
-                <a14:hiddenLine xmlns:a14="http://schemas.microsoft.com/office/drawing/2010/main" xmlns="" w="9525">
+                <a14:hiddenLine xmlns="" xmlns:a14="http://schemas.microsoft.com/office/drawing/2010/main" w="9525">
                   <a:solidFill>
                     <a:srgbClr val="000000"/>
                   </a:solidFill>
@@ -3837,7 +3837,7 @@
             </a:ln>
             <a:extLst>
               <a:ext uri="{91240B29-F687-4f45-9708-019B960494DF}">
-                <a14:hiddenLine xmlns:a14="http://schemas.microsoft.com/office/drawing/2010/main" xmlns="" w="9525">
+                <a14:hiddenLine xmlns="" xmlns:a14="http://schemas.microsoft.com/office/drawing/2010/main" w="9525">
                   <a:solidFill>
                     <a:srgbClr val="000000"/>
                   </a:solidFill>
@@ -3927,7 +3927,7 @@
             </a:ln>
             <a:extLst>
               <a:ext uri="{91240B29-F687-4f45-9708-019B960494DF}">
-                <a14:hiddenLine xmlns:a14="http://schemas.microsoft.com/office/drawing/2010/main" xmlns="" w="9525">
+                <a14:hiddenLine xmlns="" xmlns:a14="http://schemas.microsoft.com/office/drawing/2010/main" w="9525">
                   <a:solidFill>
                     <a:srgbClr val="000000"/>
                   </a:solidFill>
@@ -3989,7 +3989,7 @@
             </a:ln>
             <a:extLst>
               <a:ext uri="{91240B29-F687-4f45-9708-019B960494DF}">
-                <a14:hiddenLine xmlns:a14="http://schemas.microsoft.com/office/drawing/2010/main" xmlns="" w="9525">
+                <a14:hiddenLine xmlns="" xmlns:a14="http://schemas.microsoft.com/office/drawing/2010/main" w="9525">
                   <a:solidFill>
                     <a:srgbClr val="000000"/>
                   </a:solidFill>
@@ -4109,7 +4109,7 @@
             </a:ln>
             <a:extLst>
               <a:ext uri="{91240B29-F687-4f45-9708-019B960494DF}">
-                <a14:hiddenLine xmlns:a14="http://schemas.microsoft.com/office/drawing/2010/main" xmlns="" w="9525">
+                <a14:hiddenLine xmlns="" xmlns:a14="http://schemas.microsoft.com/office/drawing/2010/main" w="9525">
                   <a:solidFill>
                     <a:srgbClr val="000000"/>
                   </a:solidFill>
@@ -4177,7 +4177,7 @@
             </a:ln>
             <a:extLst>
               <a:ext uri="{91240B29-F687-4f45-9708-019B960494DF}">
-                <a14:hiddenLine xmlns:a14="http://schemas.microsoft.com/office/drawing/2010/main" xmlns="" w="9525">
+                <a14:hiddenLine xmlns="" xmlns:a14="http://schemas.microsoft.com/office/drawing/2010/main" w="9525">
                   <a:solidFill>
                     <a:srgbClr val="000000"/>
                   </a:solidFill>
@@ -4267,7 +4267,7 @@
             </a:ln>
             <a:extLst>
               <a:ext uri="{91240B29-F687-4f45-9708-019B960494DF}">
-                <a14:hiddenLine xmlns:a14="http://schemas.microsoft.com/office/drawing/2010/main" xmlns="" w="9525">
+                <a14:hiddenLine xmlns="" xmlns:a14="http://schemas.microsoft.com/office/drawing/2010/main" w="9525">
                   <a:solidFill>
                     <a:srgbClr val="000000"/>
                   </a:solidFill>
@@ -4407,7 +4407,7 @@
           <a:p>
             <a:fld id="{48A87A34-81AB-432B-8DAE-1953F412C126}" type="datetimeFigureOut">
               <a:rPr lang="en-US" dirty="0"/>
-              <a:t>4/26/18</a:t>
+              <a:t>4/27/18</a:t>
             </a:fld>
             <a:endParaRPr lang="en-US" dirty="0"/>
           </a:p>
@@ -4669,7 +4669,7 @@
           <a:p>
             <a:fld id="{48A87A34-81AB-432B-8DAE-1953F412C126}" type="datetimeFigureOut">
               <a:rPr lang="en-US" dirty="0"/>
-              <a:t>4/26/18</a:t>
+              <a:t>4/27/18</a:t>
             </a:fld>
             <a:endParaRPr lang="en-US" dirty="0"/>
           </a:p>
@@ -4860,7 +4860,7 @@
           <a:p>
             <a:fld id="{48A87A34-81AB-432B-8DAE-1953F412C126}" type="datetimeFigureOut">
               <a:rPr lang="en-US" dirty="0"/>
-              <a:t>4/26/18</a:t>
+              <a:t>4/27/18</a:t>
             </a:fld>
             <a:endParaRPr lang="en-US" dirty="0"/>
           </a:p>
@@ -5118,7 +5118,7 @@
           <a:p>
             <a:fld id="{48A87A34-81AB-432B-8DAE-1953F412C126}" type="datetimeFigureOut">
               <a:rPr lang="en-US" dirty="0"/>
-              <a:t>4/26/18</a:t>
+              <a:t>4/27/18</a:t>
             </a:fld>
             <a:endParaRPr lang="en-US" dirty="0"/>
           </a:p>
@@ -5547,7 +5547,7 @@
           <a:p>
             <a:fld id="{48A87A34-81AB-432B-8DAE-1953F412C126}" type="datetimeFigureOut">
               <a:rPr lang="en-US" dirty="0"/>
-              <a:t>4/26/18</a:t>
+              <a:t>4/27/18</a:t>
             </a:fld>
             <a:endParaRPr lang="en-US" dirty="0"/>
           </a:p>
@@ -6088,7 +6088,7 @@
           <a:p>
             <a:fld id="{48A87A34-81AB-432B-8DAE-1953F412C126}" type="datetimeFigureOut">
               <a:rPr lang="en-US" dirty="0"/>
-              <a:t>4/26/18</a:t>
+              <a:t>4/27/18</a:t>
             </a:fld>
             <a:endParaRPr lang="en-US" dirty="0"/>
           </a:p>
@@ -6803,7 +6803,7 @@
           <a:p>
             <a:fld id="{48A87A34-81AB-432B-8DAE-1953F412C126}" type="datetimeFigureOut">
               <a:rPr lang="en-US" dirty="0"/>
-              <a:t>4/26/18</a:t>
+              <a:t>4/27/18</a:t>
             </a:fld>
             <a:endParaRPr lang="en-US" dirty="0"/>
           </a:p>
@@ -6968,7 +6968,7 @@
           <a:p>
             <a:fld id="{48A87A34-81AB-432B-8DAE-1953F412C126}" type="datetimeFigureOut">
               <a:rPr lang="en-US" dirty="0"/>
-              <a:t>4/26/18</a:t>
+              <a:t>4/27/18</a:t>
             </a:fld>
             <a:endParaRPr lang="en-US" dirty="0"/>
           </a:p>
@@ -7143,7 +7143,7 @@
           <a:p>
             <a:fld id="{48A87A34-81AB-432B-8DAE-1953F412C126}" type="datetimeFigureOut">
               <a:rPr lang="en-US" dirty="0"/>
-              <a:t>4/26/18</a:t>
+              <a:t>4/27/18</a:t>
             </a:fld>
             <a:endParaRPr lang="en-US" dirty="0"/>
           </a:p>
@@ -7308,7 +7308,7 @@
           <a:p>
             <a:fld id="{48A87A34-81AB-432B-8DAE-1953F412C126}" type="datetimeFigureOut">
               <a:rPr lang="en-US" dirty="0"/>
-              <a:t>4/26/18</a:t>
+              <a:t>4/27/18</a:t>
             </a:fld>
             <a:endParaRPr lang="en-US" dirty="0"/>
           </a:p>
@@ -7553,7 +7553,7 @@
           <a:p>
             <a:fld id="{48A87A34-81AB-432B-8DAE-1953F412C126}" type="datetimeFigureOut">
               <a:rPr lang="en-US" dirty="0"/>
-              <a:t>4/26/18</a:t>
+              <a:t>4/27/18</a:t>
             </a:fld>
             <a:endParaRPr lang="en-US" dirty="0"/>
           </a:p>
@@ -7780,7 +7780,7 @@
           <a:p>
             <a:fld id="{48A87A34-81AB-432B-8DAE-1953F412C126}" type="datetimeFigureOut">
               <a:rPr lang="en-US" dirty="0"/>
-              <a:t>4/26/18</a:t>
+              <a:t>4/27/18</a:t>
             </a:fld>
             <a:endParaRPr lang="en-US" dirty="0"/>
           </a:p>
@@ -8156,7 +8156,7 @@
           <a:p>
             <a:fld id="{48A87A34-81AB-432B-8DAE-1953F412C126}" type="datetimeFigureOut">
               <a:rPr lang="en-US" dirty="0"/>
-              <a:t>4/26/18</a:t>
+              <a:t>4/27/18</a:t>
             </a:fld>
             <a:endParaRPr lang="en-US" dirty="0"/>
           </a:p>
@@ -8269,7 +8269,7 @@
           <a:p>
             <a:fld id="{48A87A34-81AB-432B-8DAE-1953F412C126}" type="datetimeFigureOut">
               <a:rPr lang="en-US" dirty="0"/>
-              <a:t>4/26/18</a:t>
+              <a:t>4/27/18</a:t>
             </a:fld>
             <a:endParaRPr lang="en-US" dirty="0"/>
           </a:p>
@@ -8359,7 +8359,7 @@
           <a:p>
             <a:fld id="{48A87A34-81AB-432B-8DAE-1953F412C126}" type="datetimeFigureOut">
               <a:rPr lang="en-US" dirty="0"/>
-              <a:t>4/26/18</a:t>
+              <a:t>4/27/18</a:t>
             </a:fld>
             <a:endParaRPr lang="en-US" dirty="0"/>
           </a:p>
@@ -8603,7 +8603,7 @@
           <a:p>
             <a:fld id="{48A87A34-81AB-432B-8DAE-1953F412C126}" type="datetimeFigureOut">
               <a:rPr lang="en-US" dirty="0"/>
-              <a:t>4/26/18</a:t>
+              <a:t>4/27/18</a:t>
             </a:fld>
             <a:endParaRPr lang="en-US" dirty="0"/>
           </a:p>
@@ -8878,7 +8878,7 @@
           <a:p>
             <a:fld id="{48A87A34-81AB-432B-8DAE-1953F412C126}" type="datetimeFigureOut">
               <a:rPr lang="en-US" dirty="0"/>
-              <a:t>4/26/18</a:t>
+              <a:t>4/27/18</a:t>
             </a:fld>
             <a:endParaRPr lang="en-US" dirty="0"/>
           </a:p>
@@ -8989,7 +8989,7 @@
           <a:noFill/>
           <a:extLst>
             <a:ext uri="{909E8E84-426E-40dd-AFC4-6F175D3DCCD1}">
-              <a14:hiddenFill xmlns:a14="http://schemas.microsoft.com/office/drawing/2010/main" xmlns="">
+              <a14:hiddenFill xmlns="" xmlns:a14="http://schemas.microsoft.com/office/drawing/2010/main">
                 <a:solidFill>
                   <a:srgbClr val="FFFFFF"/>
                 </a:solidFill>
@@ -9063,7 +9063,7 @@
               </a:ln>
               <a:extLst>
                 <a:ext uri="{91240B29-F687-4f45-9708-019B960494DF}">
-                  <a14:hiddenLine xmlns:a14="http://schemas.microsoft.com/office/drawing/2010/main" xmlns="" w="9525">
+                  <a14:hiddenLine xmlns="" xmlns:a14="http://schemas.microsoft.com/office/drawing/2010/main" w="9525">
                     <a:solidFill>
                       <a:srgbClr val="000000"/>
                     </a:solidFill>
@@ -9153,7 +9153,7 @@
               </a:ln>
               <a:extLst>
                 <a:ext uri="{91240B29-F687-4f45-9708-019B960494DF}">
-                  <a14:hiddenLine xmlns:a14="http://schemas.microsoft.com/office/drawing/2010/main" xmlns="" w="9525">
+                  <a14:hiddenLine xmlns="" xmlns:a14="http://schemas.microsoft.com/office/drawing/2010/main" w="9525">
                     <a:solidFill>
                       <a:srgbClr val="000000"/>
                     </a:solidFill>
@@ -9243,7 +9243,7 @@
               </a:ln>
               <a:extLst>
                 <a:ext uri="{91240B29-F687-4f45-9708-019B960494DF}">
-                  <a14:hiddenLine xmlns:a14="http://schemas.microsoft.com/office/drawing/2010/main" xmlns="" w="9525">
+                  <a14:hiddenLine xmlns="" xmlns:a14="http://schemas.microsoft.com/office/drawing/2010/main" w="9525">
                     <a:solidFill>
                       <a:srgbClr val="000000"/>
                     </a:solidFill>
@@ -9305,7 +9305,7 @@
               </a:ln>
               <a:extLst>
                 <a:ext uri="{91240B29-F687-4f45-9708-019B960494DF}">
-                  <a14:hiddenLine xmlns:a14="http://schemas.microsoft.com/office/drawing/2010/main" xmlns="" w="9525">
+                  <a14:hiddenLine xmlns="" xmlns:a14="http://schemas.microsoft.com/office/drawing/2010/main" w="9525">
                     <a:solidFill>
                       <a:srgbClr val="000000"/>
                     </a:solidFill>
@@ -9395,7 +9395,7 @@
               </a:ln>
               <a:extLst>
                 <a:ext uri="{91240B29-F687-4f45-9708-019B960494DF}">
-                  <a14:hiddenLine xmlns:a14="http://schemas.microsoft.com/office/drawing/2010/main" xmlns="" w="9525">
+                  <a14:hiddenLine xmlns="" xmlns:a14="http://schemas.microsoft.com/office/drawing/2010/main" w="9525">
                     <a:solidFill>
                       <a:srgbClr val="000000"/>
                     </a:solidFill>
@@ -9457,7 +9457,7 @@
               </a:ln>
               <a:extLst>
                 <a:ext uri="{91240B29-F687-4f45-9708-019B960494DF}">
-                  <a14:hiddenLine xmlns:a14="http://schemas.microsoft.com/office/drawing/2010/main" xmlns="" w="9525">
+                  <a14:hiddenLine xmlns="" xmlns:a14="http://schemas.microsoft.com/office/drawing/2010/main" w="9525">
                     <a:solidFill>
                       <a:srgbClr val="000000"/>
                     </a:solidFill>
@@ -9519,7 +9519,7 @@
               </a:ln>
               <a:extLst>
                 <a:ext uri="{91240B29-F687-4f45-9708-019B960494DF}">
-                  <a14:hiddenLine xmlns:a14="http://schemas.microsoft.com/office/drawing/2010/main" xmlns="" w="9525">
+                  <a14:hiddenLine xmlns="" xmlns:a14="http://schemas.microsoft.com/office/drawing/2010/main" w="9525">
                     <a:solidFill>
                       <a:srgbClr val="000000"/>
                     </a:solidFill>
@@ -9609,7 +9609,7 @@
               </a:ln>
               <a:extLst>
                 <a:ext uri="{91240B29-F687-4f45-9708-019B960494DF}">
-                  <a14:hiddenLine xmlns:a14="http://schemas.microsoft.com/office/drawing/2010/main" xmlns="" w="9525">
+                  <a14:hiddenLine xmlns="" xmlns:a14="http://schemas.microsoft.com/office/drawing/2010/main" w="9525">
                     <a:solidFill>
                       <a:srgbClr val="000000"/>
                     </a:solidFill>
@@ -9699,7 +9699,7 @@
               </a:ln>
               <a:extLst>
                 <a:ext uri="{91240B29-F687-4f45-9708-019B960494DF}">
-                  <a14:hiddenLine xmlns:a14="http://schemas.microsoft.com/office/drawing/2010/main" xmlns="" w="9525">
+                  <a14:hiddenLine xmlns="" xmlns:a14="http://schemas.microsoft.com/office/drawing/2010/main" w="9525">
                     <a:solidFill>
                       <a:srgbClr val="000000"/>
                     </a:solidFill>
@@ -9761,7 +9761,7 @@
               </a:ln>
               <a:extLst>
                 <a:ext uri="{91240B29-F687-4f45-9708-019B960494DF}">
-                  <a14:hiddenLine xmlns:a14="http://schemas.microsoft.com/office/drawing/2010/main" xmlns="" w="9525">
+                  <a14:hiddenLine xmlns="" xmlns:a14="http://schemas.microsoft.com/office/drawing/2010/main" w="9525">
                     <a:solidFill>
                       <a:srgbClr val="000000"/>
                     </a:solidFill>
@@ -9871,7 +9871,7 @@
               </a:ln>
               <a:extLst>
                 <a:ext uri="{91240B29-F687-4f45-9708-019B960494DF}">
-                  <a14:hiddenLine xmlns:a14="http://schemas.microsoft.com/office/drawing/2010/main" xmlns="" w="9525">
+                  <a14:hiddenLine xmlns="" xmlns:a14="http://schemas.microsoft.com/office/drawing/2010/main" w="9525">
                     <a:solidFill>
                       <a:srgbClr val="000000"/>
                     </a:solidFill>
@@ -9955,7 +9955,7 @@
               </a:ln>
               <a:extLst>
                 <a:ext uri="{91240B29-F687-4f45-9708-019B960494DF}">
-                  <a14:hiddenLine xmlns:a14="http://schemas.microsoft.com/office/drawing/2010/main" xmlns="" w="9525">
+                  <a14:hiddenLine xmlns="" xmlns:a14="http://schemas.microsoft.com/office/drawing/2010/main" w="9525">
                     <a:solidFill>
                       <a:srgbClr val="000000"/>
                     </a:solidFill>
@@ -10017,7 +10017,7 @@
               </a:ln>
               <a:extLst>
                 <a:ext uri="{91240B29-F687-4f45-9708-019B960494DF}">
-                  <a14:hiddenLine xmlns:a14="http://schemas.microsoft.com/office/drawing/2010/main" xmlns="" w="9525">
+                  <a14:hiddenLine xmlns="" xmlns:a14="http://schemas.microsoft.com/office/drawing/2010/main" w="9525">
                     <a:solidFill>
                       <a:srgbClr val="000000"/>
                     </a:solidFill>
@@ -10079,7 +10079,7 @@
               </a:ln>
               <a:extLst>
                 <a:ext uri="{91240B29-F687-4f45-9708-019B960494DF}">
-                  <a14:hiddenLine xmlns:a14="http://schemas.microsoft.com/office/drawing/2010/main" xmlns="" w="9525">
+                  <a14:hiddenLine xmlns="" xmlns:a14="http://schemas.microsoft.com/office/drawing/2010/main" w="9525">
                     <a:solidFill>
                       <a:srgbClr val="000000"/>
                     </a:solidFill>
@@ -10169,7 +10169,7 @@
               </a:ln>
               <a:extLst>
                 <a:ext uri="{91240B29-F687-4f45-9708-019B960494DF}">
-                  <a14:hiddenLine xmlns:a14="http://schemas.microsoft.com/office/drawing/2010/main" xmlns="" w="9525">
+                  <a14:hiddenLine xmlns="" xmlns:a14="http://schemas.microsoft.com/office/drawing/2010/main" w="9525">
                     <a:solidFill>
                       <a:srgbClr val="000000"/>
                     </a:solidFill>
@@ -10203,7 +10203,7 @@
               </a:ln>
               <a:extLst>
                 <a:ext uri="{91240B29-F687-4f45-9708-019B960494DF}">
-                  <a14:hiddenLine xmlns:a14="http://schemas.microsoft.com/office/drawing/2010/main" xmlns="" w="9525">
+                  <a14:hiddenLine xmlns="" xmlns:a14="http://schemas.microsoft.com/office/drawing/2010/main" w="9525">
                     <a:solidFill>
                       <a:srgbClr val="000000"/>
                     </a:solidFill>
@@ -10268,7 +10268,7 @@
               </a:ln>
               <a:extLst>
                 <a:ext uri="{91240B29-F687-4f45-9708-019B960494DF}">
-                  <a14:hiddenLine xmlns:a14="http://schemas.microsoft.com/office/drawing/2010/main" xmlns="" w="9525">
+                  <a14:hiddenLine xmlns="" xmlns:a14="http://schemas.microsoft.com/office/drawing/2010/main" w="9525">
                     <a:solidFill>
                       <a:srgbClr val="000000"/>
                     </a:solidFill>
@@ -10358,7 +10358,7 @@
               </a:ln>
               <a:extLst>
                 <a:ext uri="{91240B29-F687-4f45-9708-019B960494DF}">
-                  <a14:hiddenLine xmlns:a14="http://schemas.microsoft.com/office/drawing/2010/main" xmlns="" w="9525">
+                  <a14:hiddenLine xmlns="" xmlns:a14="http://schemas.microsoft.com/office/drawing/2010/main" w="9525">
                     <a:solidFill>
                       <a:srgbClr val="000000"/>
                     </a:solidFill>
@@ -10420,7 +10420,7 @@
               </a:ln>
               <a:extLst>
                 <a:ext uri="{91240B29-F687-4f45-9708-019B960494DF}">
-                  <a14:hiddenLine xmlns:a14="http://schemas.microsoft.com/office/drawing/2010/main" xmlns="" w="9525">
+                  <a14:hiddenLine xmlns="" xmlns:a14="http://schemas.microsoft.com/office/drawing/2010/main" w="9525">
                     <a:solidFill>
                       <a:srgbClr val="000000"/>
                     </a:solidFill>
@@ -10510,7 +10510,7 @@
               </a:ln>
               <a:extLst>
                 <a:ext uri="{91240B29-F687-4f45-9708-019B960494DF}">
-                  <a14:hiddenLine xmlns:a14="http://schemas.microsoft.com/office/drawing/2010/main" xmlns="" w="9525">
+                  <a14:hiddenLine xmlns="" xmlns:a14="http://schemas.microsoft.com/office/drawing/2010/main" w="9525">
                     <a:solidFill>
                       <a:srgbClr val="000000"/>
                     </a:solidFill>
@@ -10575,7 +10575,7 @@
               </a:ln>
               <a:extLst>
                 <a:ext uri="{91240B29-F687-4f45-9708-019B960494DF}">
-                  <a14:hiddenLine xmlns:a14="http://schemas.microsoft.com/office/drawing/2010/main" xmlns="" w="9525">
+                  <a14:hiddenLine xmlns="" xmlns:a14="http://schemas.microsoft.com/office/drawing/2010/main" w="9525">
                     <a:solidFill>
                       <a:srgbClr val="000000"/>
                     </a:solidFill>
@@ -10637,7 +10637,7 @@
               </a:ln>
               <a:extLst>
                 <a:ext uri="{91240B29-F687-4f45-9708-019B960494DF}">
-                  <a14:hiddenLine xmlns:a14="http://schemas.microsoft.com/office/drawing/2010/main" xmlns="" w="9525">
+                  <a14:hiddenLine xmlns="" xmlns:a14="http://schemas.microsoft.com/office/drawing/2010/main" w="9525">
                     <a:solidFill>
                       <a:srgbClr val="000000"/>
                     </a:solidFill>
@@ -10727,7 +10727,7 @@
               </a:ln>
               <a:extLst>
                 <a:ext uri="{91240B29-F687-4f45-9708-019B960494DF}">
-                  <a14:hiddenLine xmlns:a14="http://schemas.microsoft.com/office/drawing/2010/main" xmlns="" w="9525">
+                  <a14:hiddenLine xmlns="" xmlns:a14="http://schemas.microsoft.com/office/drawing/2010/main" w="9525">
                     <a:solidFill>
                       <a:srgbClr val="000000"/>
                     </a:solidFill>
@@ -10817,7 +10817,7 @@
               </a:ln>
               <a:extLst>
                 <a:ext uri="{91240B29-F687-4f45-9708-019B960494DF}">
-                  <a14:hiddenLine xmlns:a14="http://schemas.microsoft.com/office/drawing/2010/main" xmlns="" w="9525">
+                  <a14:hiddenLine xmlns="" xmlns:a14="http://schemas.microsoft.com/office/drawing/2010/main" w="9525">
                     <a:solidFill>
                       <a:srgbClr val="000000"/>
                     </a:solidFill>
@@ -10882,7 +10882,7 @@
               </a:ln>
               <a:extLst>
                 <a:ext uri="{91240B29-F687-4f45-9708-019B960494DF}">
-                  <a14:hiddenLine xmlns:a14="http://schemas.microsoft.com/office/drawing/2010/main" xmlns="" w="9525">
+                  <a14:hiddenLine xmlns="" xmlns:a14="http://schemas.microsoft.com/office/drawing/2010/main" w="9525">
                     <a:solidFill>
                       <a:srgbClr val="000000"/>
                     </a:solidFill>
@@ -11002,7 +11002,7 @@
               </a:ln>
               <a:extLst>
                 <a:ext uri="{91240B29-F687-4f45-9708-019B960494DF}">
-                  <a14:hiddenLine xmlns:a14="http://schemas.microsoft.com/office/drawing/2010/main" xmlns="" w="9525">
+                  <a14:hiddenLine xmlns="" xmlns:a14="http://schemas.microsoft.com/office/drawing/2010/main" w="9525">
                     <a:solidFill>
                       <a:srgbClr val="000000"/>
                     </a:solidFill>
@@ -11100,7 +11100,7 @@
               </a:ln>
               <a:extLst>
                 <a:ext uri="{91240B29-F687-4f45-9708-019B960494DF}">
-                  <a14:hiddenLine xmlns:a14="http://schemas.microsoft.com/office/drawing/2010/main" xmlns="" w="9525">
+                  <a14:hiddenLine xmlns="" xmlns:a14="http://schemas.microsoft.com/office/drawing/2010/main" w="9525">
                     <a:solidFill>
                       <a:srgbClr val="000000"/>
                     </a:solidFill>
@@ -11215,7 +11215,7 @@
               </a:ln>
               <a:extLst>
                 <a:ext uri="{91240B29-F687-4f45-9708-019B960494DF}">
-                  <a14:hiddenLine xmlns:a14="http://schemas.microsoft.com/office/drawing/2010/main" xmlns="" w="9525">
+                  <a14:hiddenLine xmlns="" xmlns:a14="http://schemas.microsoft.com/office/drawing/2010/main" w="9525">
                     <a:solidFill>
                       <a:srgbClr val="000000"/>
                     </a:solidFill>
@@ -11305,7 +11305,7 @@
               </a:ln>
               <a:extLst>
                 <a:ext uri="{91240B29-F687-4f45-9708-019B960494DF}">
-                  <a14:hiddenLine xmlns:a14="http://schemas.microsoft.com/office/drawing/2010/main" xmlns="" w="9525">
+                  <a14:hiddenLine xmlns="" xmlns:a14="http://schemas.microsoft.com/office/drawing/2010/main" w="9525">
                     <a:solidFill>
                       <a:srgbClr val="000000"/>
                     </a:solidFill>
@@ -11370,7 +11370,7 @@
               </a:ln>
               <a:extLst>
                 <a:ext uri="{91240B29-F687-4f45-9708-019B960494DF}">
-                  <a14:hiddenLine xmlns:a14="http://schemas.microsoft.com/office/drawing/2010/main" xmlns="" w="9525">
+                  <a14:hiddenLine xmlns="" xmlns:a14="http://schemas.microsoft.com/office/drawing/2010/main" w="9525">
                     <a:solidFill>
                       <a:srgbClr val="000000"/>
                     </a:solidFill>
@@ -11460,7 +11460,7 @@
               </a:ln>
               <a:extLst>
                 <a:ext uri="{91240B29-F687-4f45-9708-019B960494DF}">
-                  <a14:hiddenLine xmlns:a14="http://schemas.microsoft.com/office/drawing/2010/main" xmlns="" w="9525">
+                  <a14:hiddenLine xmlns="" xmlns:a14="http://schemas.microsoft.com/office/drawing/2010/main" w="9525">
                     <a:solidFill>
                       <a:srgbClr val="000000"/>
                     </a:solidFill>
@@ -11528,7 +11528,7 @@
               </a:ln>
               <a:extLst>
                 <a:ext uri="{91240B29-F687-4f45-9708-019B960494DF}">
-                  <a14:hiddenLine xmlns:a14="http://schemas.microsoft.com/office/drawing/2010/main" xmlns="" w="9525">
+                  <a14:hiddenLine xmlns="" xmlns:a14="http://schemas.microsoft.com/office/drawing/2010/main" w="9525">
                     <a:solidFill>
                       <a:srgbClr val="000000"/>
                     </a:solidFill>
@@ -11618,7 +11618,7 @@
               </a:ln>
               <a:extLst>
                 <a:ext uri="{91240B29-F687-4f45-9708-019B960494DF}">
-                  <a14:hiddenLine xmlns:a14="http://schemas.microsoft.com/office/drawing/2010/main" xmlns="" w="9525">
+                  <a14:hiddenLine xmlns="" xmlns:a14="http://schemas.microsoft.com/office/drawing/2010/main" w="9525">
                     <a:solidFill>
                       <a:srgbClr val="000000"/>
                     </a:solidFill>
@@ -11686,7 +11686,7 @@
               </a:ln>
               <a:extLst>
                 <a:ext uri="{91240B29-F687-4f45-9708-019B960494DF}">
-                  <a14:hiddenLine xmlns:a14="http://schemas.microsoft.com/office/drawing/2010/main" xmlns="" w="9525">
+                  <a14:hiddenLine xmlns="" xmlns:a14="http://schemas.microsoft.com/office/drawing/2010/main" w="9525">
                     <a:solidFill>
                       <a:srgbClr val="000000"/>
                     </a:solidFill>
@@ -11776,7 +11776,7 @@
               </a:ln>
               <a:extLst>
                 <a:ext uri="{91240B29-F687-4f45-9708-019B960494DF}">
-                  <a14:hiddenLine xmlns:a14="http://schemas.microsoft.com/office/drawing/2010/main" xmlns="" w="9525">
+                  <a14:hiddenLine xmlns="" xmlns:a14="http://schemas.microsoft.com/office/drawing/2010/main" w="9525">
                     <a:solidFill>
                       <a:srgbClr val="000000"/>
                     </a:solidFill>
@@ -11810,7 +11810,7 @@
               </a:ln>
               <a:extLst>
                 <a:ext uri="{91240B29-F687-4f45-9708-019B960494DF}">
-                  <a14:hiddenLine xmlns:a14="http://schemas.microsoft.com/office/drawing/2010/main" xmlns="" w="9525">
+                  <a14:hiddenLine xmlns="" xmlns:a14="http://schemas.microsoft.com/office/drawing/2010/main" w="9525">
                     <a:solidFill>
                       <a:srgbClr val="000000"/>
                     </a:solidFill>
@@ -11951,7 +11951,7 @@
             <a:fld id="{48A87A34-81AB-432B-8DAE-1953F412C126}" type="datetimeFigureOut">
               <a:rPr lang="en-US" dirty="0"/>
               <a:pPr/>
-              <a:t>4/26/18</a:t>
+              <a:t>4/27/18</a:t>
             </a:fld>
             <a:endParaRPr lang="en-US" dirty="0"/>
           </a:p>
@@ -12497,7 +12497,12 @@
             <p:ph idx="1"/>
           </p:nvPr>
         </p:nvSpPr>
-        <p:spPr/>
+        <p:spPr>
+          <a:xfrm>
+            <a:off x="1141412" y="2249487"/>
+            <a:ext cx="9905999" cy="3541714"/>
+          </a:xfrm>
+        </p:spPr>
         <p:txBody>
           <a:bodyPr>
             <a:normAutofit/>
@@ -12525,7 +12530,7 @@
           <a:p>
             <a:r>
               <a:rPr lang="en-US" dirty="0"/>
-              <a:t>Generated images are then converted back into audio which will (hopefully) be realistic</a:t>
+              <a:t>Generated images are then converted back into audio which will (hopefully) be realistic, with the correct overtones, attack, etc.</a:t>
             </a:r>
           </a:p>
         </p:txBody>

</xml_diff>